<commit_message>
just references to do
</commit_message>
<xml_diff>
--- a/originals/animation.pptx
+++ b/originals/animation.pptx
@@ -104,6 +104,11 @@
       </a:defRPr>
     </a:lvl9pPr>
   </p:defaultTextStyle>
+  <p:extLst>
+    <p:ext uri="{EFAFB233-063F-42B5-8137-9DF3F51BA10A}">
+      <p15:sldGuideLst xmlns:p15="http://schemas.microsoft.com/office/powerpoint/2012/main"/>
+    </p:ext>
+  </p:extLst>
 </p:presentation>
 </file>
 
@@ -256,7 +261,7 @@
           <a:p>
             <a:fld id="{397FBD6A-A098-4E83-8C59-AB62D5074272}" type="datetimeFigureOut">
               <a:rPr lang="en-CA" smtClean="0"/>
-              <a:t>2020-12-01</a:t>
+              <a:t>2020-12-03</a:t>
             </a:fld>
             <a:endParaRPr lang="en-CA"/>
           </a:p>
@@ -456,7 +461,7 @@
           <a:p>
             <a:fld id="{397FBD6A-A098-4E83-8C59-AB62D5074272}" type="datetimeFigureOut">
               <a:rPr lang="en-CA" smtClean="0"/>
-              <a:t>2020-12-01</a:t>
+              <a:t>2020-12-03</a:t>
             </a:fld>
             <a:endParaRPr lang="en-CA"/>
           </a:p>
@@ -666,7 +671,7 @@
           <a:p>
             <a:fld id="{397FBD6A-A098-4E83-8C59-AB62D5074272}" type="datetimeFigureOut">
               <a:rPr lang="en-CA" smtClean="0"/>
-              <a:t>2020-12-01</a:t>
+              <a:t>2020-12-03</a:t>
             </a:fld>
             <a:endParaRPr lang="en-CA"/>
           </a:p>
@@ -866,7 +871,7 @@
           <a:p>
             <a:fld id="{397FBD6A-A098-4E83-8C59-AB62D5074272}" type="datetimeFigureOut">
               <a:rPr lang="en-CA" smtClean="0"/>
-              <a:t>2020-12-01</a:t>
+              <a:t>2020-12-03</a:t>
             </a:fld>
             <a:endParaRPr lang="en-CA"/>
           </a:p>
@@ -1142,7 +1147,7 @@
           <a:p>
             <a:fld id="{397FBD6A-A098-4E83-8C59-AB62D5074272}" type="datetimeFigureOut">
               <a:rPr lang="en-CA" smtClean="0"/>
-              <a:t>2020-12-01</a:t>
+              <a:t>2020-12-03</a:t>
             </a:fld>
             <a:endParaRPr lang="en-CA"/>
           </a:p>
@@ -1410,7 +1415,7 @@
           <a:p>
             <a:fld id="{397FBD6A-A098-4E83-8C59-AB62D5074272}" type="datetimeFigureOut">
               <a:rPr lang="en-CA" smtClean="0"/>
-              <a:t>2020-12-01</a:t>
+              <a:t>2020-12-03</a:t>
             </a:fld>
             <a:endParaRPr lang="en-CA"/>
           </a:p>
@@ -1825,7 +1830,7 @@
           <a:p>
             <a:fld id="{397FBD6A-A098-4E83-8C59-AB62D5074272}" type="datetimeFigureOut">
               <a:rPr lang="en-CA" smtClean="0"/>
-              <a:t>2020-12-01</a:t>
+              <a:t>2020-12-03</a:t>
             </a:fld>
             <a:endParaRPr lang="en-CA"/>
           </a:p>
@@ -1967,7 +1972,7 @@
           <a:p>
             <a:fld id="{397FBD6A-A098-4E83-8C59-AB62D5074272}" type="datetimeFigureOut">
               <a:rPr lang="en-CA" smtClean="0"/>
-              <a:t>2020-12-01</a:t>
+              <a:t>2020-12-03</a:t>
             </a:fld>
             <a:endParaRPr lang="en-CA"/>
           </a:p>
@@ -2080,7 +2085,7 @@
           <a:p>
             <a:fld id="{397FBD6A-A098-4E83-8C59-AB62D5074272}" type="datetimeFigureOut">
               <a:rPr lang="en-CA" smtClean="0"/>
-              <a:t>2020-12-01</a:t>
+              <a:t>2020-12-03</a:t>
             </a:fld>
             <a:endParaRPr lang="en-CA"/>
           </a:p>
@@ -2393,7 +2398,7 @@
           <a:p>
             <a:fld id="{397FBD6A-A098-4E83-8C59-AB62D5074272}" type="datetimeFigureOut">
               <a:rPr lang="en-CA" smtClean="0"/>
-              <a:t>2020-12-01</a:t>
+              <a:t>2020-12-03</a:t>
             </a:fld>
             <a:endParaRPr lang="en-CA"/>
           </a:p>
@@ -2682,7 +2687,7 @@
           <a:p>
             <a:fld id="{397FBD6A-A098-4E83-8C59-AB62D5074272}" type="datetimeFigureOut">
               <a:rPr lang="en-CA" smtClean="0"/>
-              <a:t>2020-12-01</a:t>
+              <a:t>2020-12-03</a:t>
             </a:fld>
             <a:endParaRPr lang="en-CA"/>
           </a:p>
@@ -2925,7 +2930,7 @@
           <a:p>
             <a:fld id="{397FBD6A-A098-4E83-8C59-AB62D5074272}" type="datetimeFigureOut">
               <a:rPr lang="en-CA" smtClean="0"/>
-              <a:t>2020-12-01</a:t>
+              <a:t>2020-12-03</a:t>
             </a:fld>
             <a:endParaRPr lang="en-CA"/>
           </a:p>
@@ -3680,6 +3685,46 @@
           </a:extLst>
         </p:spPr>
       </p:pic>
+      <p:sp>
+        <p:nvSpPr>
+          <p:cNvPr id="2" name="TextBox 1">
+            <a:extLst>
+              <a:ext uri="{FF2B5EF4-FFF2-40B4-BE49-F238E27FC236}">
+                <a16:creationId xmlns:a16="http://schemas.microsoft.com/office/drawing/2014/main" id="{6B1DD5F3-91D0-43CC-B3CA-35BA09A31566}"/>
+              </a:ext>
+            </a:extLst>
+          </p:cNvPr>
+          <p:cNvSpPr txBox="1"/>
+          <p:nvPr/>
+        </p:nvSpPr>
+        <p:spPr>
+          <a:xfrm>
+            <a:off x="9877804" y="5923827"/>
+            <a:ext cx="1787935" cy="646331"/>
+          </a:xfrm>
+          <a:prstGeom prst="rect">
+            <a:avLst/>
+          </a:prstGeom>
+          <a:noFill/>
+        </p:spPr>
+        <p:txBody>
+          <a:bodyPr wrap="square" rtlCol="0">
+            <a:spAutoFit/>
+          </a:bodyPr>
+          <a:lstStyle/>
+          <a:p>
+            <a:r>
+              <a:rPr lang="en-US" sz="3600" b="1" dirty="0" err="1">
+                <a:latin typeface="Quicksand SemiBold" pitchFamily="2" charset="0"/>
+              </a:rPr>
+              <a:t>rgabrie</a:t>
+            </a:r>
+            <a:endParaRPr lang="en-CA" sz="3600" b="1" dirty="0">
+              <a:latin typeface="Quicksand SemiBold" pitchFamily="2" charset="0"/>
+            </a:endParaRPr>
+          </a:p>
+        </p:txBody>
+      </p:sp>
     </p:spTree>
     <p:extLst>
       <p:ext uri="{BB962C8B-B14F-4D97-AF65-F5344CB8AC3E}">
@@ -3768,24 +3813,46 @@
                                       </p:childTnLst>
                                     </p:cTn>
                                   </p:par>
+                                  <p:par>
+                                    <p:cTn id="10" presetID="42" presetClass="path" presetSubtype="0" accel="50000" decel="50000" fill="hold" nodeType="withEffect">
+                                      <p:stCondLst>
+                                        <p:cond delay="0"/>
+                                      </p:stCondLst>
+                                      <p:childTnLst>
+                                        <p:animMotion origin="layout" path="M -2.91667E-6 -4.81481E-6 L 0.0681 0.04676 " pathEditMode="relative" rAng="0" ptsTypes="AA">
+                                          <p:cBhvr>
+                                            <p:cTn id="11" dur="2000" fill="hold"/>
+                                            <p:tgtEl>
+                                              <p:spTgt spid="1040"/>
+                                            </p:tgtEl>
+                                            <p:attrNameLst>
+                                              <p:attrName>ppt_x</p:attrName>
+                                              <p:attrName>ppt_y</p:attrName>
+                                            </p:attrNameLst>
+                                          </p:cBhvr>
+                                          <p:rCtr x="3320" y="2338"/>
+                                        </p:animMotion>
+                                      </p:childTnLst>
+                                    </p:cTn>
+                                  </p:par>
                                 </p:childTnLst>
                               </p:cTn>
                             </p:par>
                             <p:par>
-                              <p:cTn id="10" fill="hold">
+                              <p:cTn id="12" fill="hold">
                                 <p:stCondLst>
-                                  <p:cond delay="2000"/>
+                                  <p:cond delay="3000"/>
                                 </p:stCondLst>
                                 <p:childTnLst>
                                   <p:par>
-                                    <p:cTn id="11" presetID="42" presetClass="path" presetSubtype="0" accel="50000" decel="50000" fill="hold" nodeType="afterEffect">
+                                    <p:cTn id="13" presetID="42" presetClass="path" presetSubtype="0" accel="50000" decel="50000" fill="hold" nodeType="afterEffect">
                                       <p:stCondLst>
                                         <p:cond delay="0"/>
                                       </p:stCondLst>
                                       <p:childTnLst>
                                         <p:animMotion origin="layout" path="M -0.09271 0.00486 L -2.70833E-6 -2.22222E-6 " pathEditMode="relative" rAng="0" ptsTypes="AA">
                                           <p:cBhvr>
-                                            <p:cTn id="12" dur="1000" fill="hold"/>
+                                            <p:cTn id="14" dur="1000" fill="hold"/>
                                             <p:tgtEl>
                                               <p:spTgt spid="13"/>
                                             </p:tgtEl>
@@ -3803,20 +3870,20 @@
                               </p:cTn>
                             </p:par>
                             <p:par>
-                              <p:cTn id="13" fill="hold">
+                              <p:cTn id="15" fill="hold">
                                 <p:stCondLst>
-                                  <p:cond delay="3000"/>
+                                  <p:cond delay="4000"/>
                                 </p:stCondLst>
                                 <p:childTnLst>
                                   <p:par>
-                                    <p:cTn id="14" presetID="8" presetClass="emph" presetSubtype="0" fill="hold" nodeType="afterEffect">
+                                    <p:cTn id="16" presetID="8" presetClass="emph" presetSubtype="0" fill="hold" nodeType="afterEffect">
                                       <p:stCondLst>
                                         <p:cond delay="0"/>
                                       </p:stCondLst>
                                       <p:childTnLst>
                                         <p:animRot by="-1500000">
                                           <p:cBhvr>
-                                            <p:cTn id="15" dur="2000" fill="hold"/>
+                                            <p:cTn id="17" dur="2000" fill="hold"/>
                                             <p:tgtEl>
                                               <p:spTgt spid="1040"/>
                                             </p:tgtEl>
@@ -3828,24 +3895,46 @@
                                       </p:childTnLst>
                                     </p:cTn>
                                   </p:par>
+                                  <p:par>
+                                    <p:cTn id="18" presetID="42" presetClass="path" presetSubtype="0" accel="50000" decel="50000" fill="hold" nodeType="withEffect">
+                                      <p:stCondLst>
+                                        <p:cond delay="0"/>
+                                      </p:stCondLst>
+                                      <p:childTnLst>
+                                        <p:animMotion origin="layout" path="M 0.0681 0.04676 L -0.01953 -0.0162 " pathEditMode="relative" rAng="0" ptsTypes="AA">
+                                          <p:cBhvr>
+                                            <p:cTn id="19" dur="2000" fill="hold"/>
+                                            <p:tgtEl>
+                                              <p:spTgt spid="1040"/>
+                                            </p:tgtEl>
+                                            <p:attrNameLst>
+                                              <p:attrName>ppt_x</p:attrName>
+                                              <p:attrName>ppt_y</p:attrName>
+                                            </p:attrNameLst>
+                                          </p:cBhvr>
+                                          <p:rCtr x="-4388" y="-3148"/>
+                                        </p:animMotion>
+                                      </p:childTnLst>
+                                    </p:cTn>
+                                  </p:par>
                                 </p:childTnLst>
                               </p:cTn>
                             </p:par>
                             <p:par>
-                              <p:cTn id="16" fill="hold">
+                              <p:cTn id="20" fill="hold">
                                 <p:stCondLst>
-                                  <p:cond delay="5000"/>
+                                  <p:cond delay="6000"/>
                                 </p:stCondLst>
                                 <p:childTnLst>
                                   <p:par>
-                                    <p:cTn id="17" presetID="8" presetClass="emph" presetSubtype="0" fill="hold" nodeType="afterEffect">
+                                    <p:cTn id="21" presetID="8" presetClass="emph" presetSubtype="0" fill="hold" nodeType="afterEffect">
                                       <p:stCondLst>
                                         <p:cond delay="0"/>
                                       </p:stCondLst>
                                       <p:childTnLst>
                                         <p:animRot by="1620000">
                                           <p:cBhvr>
-                                            <p:cTn id="18" dur="500" fill="hold"/>
+                                            <p:cTn id="22" dur="500" fill="hold"/>
                                             <p:tgtEl>
                                               <p:spTgt spid="1040"/>
                                             </p:tgtEl>
@@ -3861,7 +3950,7 @@
                                             <p:cTn display="0" masterRel="sameClick">
                                               <p:stCondLst>
                                                 <p:cond evt="begin" delay="0">
-                                                  <p:tn val="17"/>
+                                                  <p:tn val="21"/>
                                                 </p:cond>
                                               </p:stCondLst>
                                               <p:endCondLst>
@@ -3884,20 +3973,20 @@
                               </p:cTn>
                             </p:par>
                             <p:par>
-                              <p:cTn id="19" fill="hold">
+                              <p:cTn id="23" fill="hold">
                                 <p:stCondLst>
-                                  <p:cond delay="5500"/>
+                                  <p:cond delay="6500"/>
                                 </p:stCondLst>
                                 <p:childTnLst>
                                   <p:par>
-                                    <p:cTn id="20" presetID="42" presetClass="path" presetSubtype="0" accel="50000" decel="50000" fill="hold" nodeType="afterEffect">
+                                    <p:cTn id="24" presetID="42" presetClass="path" presetSubtype="0" accel="50000" decel="50000" fill="hold" nodeType="afterEffect">
                                       <p:stCondLst>
                                         <p:cond delay="0"/>
                                       </p:stCondLst>
                                       <p:childTnLst>
-                                        <p:animMotion origin="layout" path="M -1.04167E-6 1.85185E-6 L -0.41797 -0.49514 " pathEditMode="relative" rAng="0" ptsTypes="AA">
+                                        <p:animMotion origin="layout" path="M -1.04167E-6 1.85185E-6 L -0.44792 -0.40671 " pathEditMode="relative" rAng="0" ptsTypes="AA">
                                           <p:cBhvr>
-                                            <p:cTn id="21" dur="1000" fill="hold"/>
+                                            <p:cTn id="25" dur="1000" fill="hold"/>
                                             <p:tgtEl>
                                               <p:spTgt spid="1042"/>
                                             </p:tgtEl>
@@ -3906,20 +3995,20 @@
                                               <p:attrName>ppt_y</p:attrName>
                                             </p:attrNameLst>
                                           </p:cBhvr>
-                                          <p:rCtr x="-20898" y="-24769"/>
+                                          <p:rCtr x="-22396" y="-20347"/>
                                         </p:animMotion>
                                       </p:childTnLst>
                                     </p:cTn>
                                   </p:par>
                                   <p:par>
-                                    <p:cTn id="22" presetID="6" presetClass="emph" presetSubtype="0" fill="hold" nodeType="withEffect" p14:presetBounceEnd="52000">
+                                    <p:cTn id="26" presetID="6" presetClass="emph" presetSubtype="0" fill="hold" nodeType="withEffect" p14:presetBounceEnd="52000">
                                       <p:stCondLst>
                                         <p:cond delay="0"/>
                                       </p:stCondLst>
                                       <p:childTnLst>
                                         <p:animScale p14:bounceEnd="52000">
                                           <p:cBhvr>
-                                            <p:cTn id="23" dur="1000" fill="hold"/>
+                                            <p:cTn id="27" dur="1000" fill="hold"/>
                                             <p:tgtEl>
                                               <p:spTgt spid="1042"/>
                                             </p:tgtEl>
@@ -3933,20 +4022,20 @@
                               </p:cTn>
                             </p:par>
                             <p:par>
-                              <p:cTn id="24" fill="hold">
+                              <p:cTn id="28" fill="hold">
                                 <p:stCondLst>
-                                  <p:cond delay="6500"/>
+                                  <p:cond delay="7500"/>
                                 </p:stCondLst>
                                 <p:childTnLst>
                                   <p:par>
-                                    <p:cTn id="25" presetID="41" presetClass="path" presetSubtype="0" accel="50000" decel="50000" fill="hold" nodeType="afterEffect">
+                                    <p:cTn id="29" presetID="41" presetClass="path" presetSubtype="0" accel="50000" decel="50000" fill="hold" nodeType="afterEffect">
                                       <p:stCondLst>
                                         <p:cond delay="0"/>
                                       </p:stCondLst>
                                       <p:childTnLst>
-                                        <p:animMotion origin="layout" path="M -0.41797 -0.49514 C -0.41888 -0.50533 -0.42148 -0.51505 -0.42239 -0.51505 C -0.42812 -0.51505 -0.43411 -0.35672 -0.43411 -0.19746 C -0.43411 -0.27778 -0.43711 -0.35672 -0.43984 -0.35672 C -0.44284 -0.35672 -0.44557 -0.27662 -0.44557 -0.19746 C -0.44557 -0.23704 -0.44687 -0.27778 -0.44857 -0.27778 C -0.44987 -0.27778 -0.45143 -0.23843 -0.45143 -0.19746 C -0.45143 -0.21806 -0.45221 -0.23704 -0.45299 -0.23704 C -0.45364 -0.23704 -0.45443 -0.21713 -0.45443 -0.19746 C -0.45443 -0.2081 -0.45482 -0.21806 -0.45521 -0.21806 C -0.45534 -0.21806 -0.45586 -0.20787 -0.45586 -0.19746 C -0.45586 -0.20278 -0.45612 -0.2081 -0.45625 -0.2081 C -0.45625 -0.20926 -0.45664 -0.20301 -0.45664 -0.19746 C -0.45664 -0.20023 -0.45664 -0.20278 -0.45677 -0.20278 C -0.45677 -0.20162 -0.45703 -0.2 -0.45703 -0.19746 C -0.45703 -0.19885 -0.45703 -0.20023 -0.45703 -0.20162 C -0.45716 -0.20162 -0.45716 -0.20023 -0.45716 -0.19885 C -0.45729 -0.19885 -0.45729 -0.2 -0.45729 -0.20162 C -0.45742 -0.20162 -0.45742 -0.20023 -0.45742 -0.19885 " pathEditMode="relative" rAng="0" ptsTypes="AAAAAAAAAAAAAAAAAAA">
+                                        <p:animMotion origin="layout" path="M -0.44792 -0.40671 C -0.44831 -0.41366 -0.44935 -0.41991 -0.44974 -0.41991 C -0.45169 -0.41991 -0.45417 -0.31273 -0.45417 -0.20463 C -0.45417 -0.25949 -0.45508 -0.31273 -0.45612 -0.31273 C -0.45716 -0.31273 -0.4582 -0.25857 -0.4582 -0.20463 C -0.4582 -0.23171 -0.45846 -0.25949 -0.45911 -0.25949 C -0.4595 -0.25949 -0.46016 -0.23264 -0.46016 -0.20463 C -0.46016 -0.21898 -0.46055 -0.23171 -0.46081 -0.23171 C -0.46081 -0.23148 -0.4612 -0.21829 -0.4612 -0.20463 C -0.4612 -0.21204 -0.46159 -0.21898 -0.46159 -0.21875 C -0.46159 -0.21898 -0.46185 -0.21181 -0.46185 -0.20463 C -0.46185 -0.20857 -0.46185 -0.21204 -0.46185 -0.21181 C -0.46185 -0.21296 -0.46211 -0.20857 -0.46211 -0.20463 C -0.46211 -0.20671 -0.46211 -0.20857 -0.46211 -0.20834 C -0.46211 -0.20764 -0.46211 -0.20648 -0.46211 -0.20463 C -0.46211 -0.20579 -0.46211 -0.20671 -0.46211 -0.20764 C -0.46211 -0.20741 -0.46211 -0.20671 -0.46211 -0.20579 C -0.46211 -0.20556 -0.46211 -0.20648 -0.46211 -0.20764 C -0.46211 -0.20741 -0.46211 -0.20671 -0.46211 -0.20579 " pathEditMode="relative" rAng="0" ptsTypes="AAAAAAAAAAAAAAAAAAA">
                                           <p:cBhvr>
-                                            <p:cTn id="26" dur="1000" fill="hold"/>
+                                            <p:cTn id="30" dur="1000" fill="hold"/>
                                             <p:tgtEl>
                                               <p:spTgt spid="1042"/>
                                             </p:tgtEl>
@@ -3955,7 +4044,7 @@
                                               <p:attrName>ppt_y</p:attrName>
                                             </p:attrNameLst>
                                           </p:cBhvr>
-                                          <p:rCtr x="-1979" y="13889"/>
+                                          <p:rCtr x="-716" y="9444"/>
                                         </p:animMotion>
                                       </p:childTnLst>
                                       <p:subTnLst>
@@ -3964,7 +4053,7 @@
                                             <p:cTn display="0" masterRel="sameClick">
                                               <p:stCondLst>
                                                 <p:cond evt="begin" delay="0">
-                                                  <p:tn val="25"/>
+                                                  <p:tn val="29"/>
                                                 </p:cond>
                                               </p:stCondLst>
                                               <p:endCondLst>
@@ -4089,24 +4178,46 @@
                                       </p:childTnLst>
                                     </p:cTn>
                                   </p:par>
+                                  <p:par>
+                                    <p:cTn id="10" presetID="42" presetClass="path" presetSubtype="0" accel="50000" decel="50000" fill="hold" nodeType="withEffect">
+                                      <p:stCondLst>
+                                        <p:cond delay="0"/>
+                                      </p:stCondLst>
+                                      <p:childTnLst>
+                                        <p:animMotion origin="layout" path="M -2.91667E-6 -4.81481E-6 L 0.0681 0.04676 " pathEditMode="relative" rAng="0" ptsTypes="AA">
+                                          <p:cBhvr>
+                                            <p:cTn id="11" dur="2000" fill="hold"/>
+                                            <p:tgtEl>
+                                              <p:spTgt spid="1040"/>
+                                            </p:tgtEl>
+                                            <p:attrNameLst>
+                                              <p:attrName>ppt_x</p:attrName>
+                                              <p:attrName>ppt_y</p:attrName>
+                                            </p:attrNameLst>
+                                          </p:cBhvr>
+                                          <p:rCtr x="3320" y="2338"/>
+                                        </p:animMotion>
+                                      </p:childTnLst>
+                                    </p:cTn>
+                                  </p:par>
                                 </p:childTnLst>
                               </p:cTn>
                             </p:par>
                             <p:par>
-                              <p:cTn id="10" fill="hold">
+                              <p:cTn id="12" fill="hold">
                                 <p:stCondLst>
-                                  <p:cond delay="2000"/>
+                                  <p:cond delay="3000"/>
                                 </p:stCondLst>
                                 <p:childTnLst>
                                   <p:par>
-                                    <p:cTn id="11" presetID="42" presetClass="path" presetSubtype="0" accel="50000" decel="50000" fill="hold" nodeType="afterEffect">
+                                    <p:cTn id="13" presetID="42" presetClass="path" presetSubtype="0" accel="50000" decel="50000" fill="hold" nodeType="afterEffect">
                                       <p:stCondLst>
                                         <p:cond delay="0"/>
                                       </p:stCondLst>
                                       <p:childTnLst>
                                         <p:animMotion origin="layout" path="M -0.09271 0.00486 L -2.70833E-6 -2.22222E-6 " pathEditMode="relative" rAng="0" ptsTypes="AA">
                                           <p:cBhvr>
-                                            <p:cTn id="12" dur="1000" fill="hold"/>
+                                            <p:cTn id="14" dur="1000" fill="hold"/>
                                             <p:tgtEl>
                                               <p:spTgt spid="13"/>
                                             </p:tgtEl>
@@ -4124,20 +4235,20 @@
                               </p:cTn>
                             </p:par>
                             <p:par>
-                              <p:cTn id="13" fill="hold">
+                              <p:cTn id="15" fill="hold">
                                 <p:stCondLst>
-                                  <p:cond delay="3000"/>
+                                  <p:cond delay="4000"/>
                                 </p:stCondLst>
                                 <p:childTnLst>
                                   <p:par>
-                                    <p:cTn id="14" presetID="8" presetClass="emph" presetSubtype="0" fill="hold" nodeType="afterEffect">
+                                    <p:cTn id="16" presetID="8" presetClass="emph" presetSubtype="0" fill="hold" nodeType="afterEffect">
                                       <p:stCondLst>
                                         <p:cond delay="0"/>
                                       </p:stCondLst>
                                       <p:childTnLst>
                                         <p:animRot by="-1500000">
                                           <p:cBhvr>
-                                            <p:cTn id="15" dur="2000" fill="hold"/>
+                                            <p:cTn id="17" dur="2000" fill="hold"/>
                                             <p:tgtEl>
                                               <p:spTgt spid="1040"/>
                                             </p:tgtEl>
@@ -4149,24 +4260,46 @@
                                       </p:childTnLst>
                                     </p:cTn>
                                   </p:par>
+                                  <p:par>
+                                    <p:cTn id="18" presetID="42" presetClass="path" presetSubtype="0" accel="50000" decel="50000" fill="hold" nodeType="withEffect">
+                                      <p:stCondLst>
+                                        <p:cond delay="0"/>
+                                      </p:stCondLst>
+                                      <p:childTnLst>
+                                        <p:animMotion origin="layout" path="M 0.0681 0.04676 L -0.01953 -0.0162 " pathEditMode="relative" rAng="0" ptsTypes="AA">
+                                          <p:cBhvr>
+                                            <p:cTn id="19" dur="2000" fill="hold"/>
+                                            <p:tgtEl>
+                                              <p:spTgt spid="1040"/>
+                                            </p:tgtEl>
+                                            <p:attrNameLst>
+                                              <p:attrName>ppt_x</p:attrName>
+                                              <p:attrName>ppt_y</p:attrName>
+                                            </p:attrNameLst>
+                                          </p:cBhvr>
+                                          <p:rCtr x="-4388" y="-3148"/>
+                                        </p:animMotion>
+                                      </p:childTnLst>
+                                    </p:cTn>
+                                  </p:par>
                                 </p:childTnLst>
                               </p:cTn>
                             </p:par>
                             <p:par>
-                              <p:cTn id="16" fill="hold">
+                              <p:cTn id="20" fill="hold">
                                 <p:stCondLst>
-                                  <p:cond delay="5000"/>
+                                  <p:cond delay="6000"/>
                                 </p:stCondLst>
                                 <p:childTnLst>
                                   <p:par>
-                                    <p:cTn id="17" presetID="8" presetClass="emph" presetSubtype="0" fill="hold" nodeType="afterEffect">
+                                    <p:cTn id="21" presetID="8" presetClass="emph" presetSubtype="0" fill="hold" nodeType="afterEffect">
                                       <p:stCondLst>
                                         <p:cond delay="0"/>
                                       </p:stCondLst>
                                       <p:childTnLst>
                                         <p:animRot by="1620000">
                                           <p:cBhvr>
-                                            <p:cTn id="18" dur="500" fill="hold"/>
+                                            <p:cTn id="22" dur="500" fill="hold"/>
                                             <p:tgtEl>
                                               <p:spTgt spid="1040"/>
                                             </p:tgtEl>
@@ -4182,7 +4315,7 @@
                                             <p:cTn display="0" masterRel="sameClick">
                                               <p:stCondLst>
                                                 <p:cond evt="begin" delay="0">
-                                                  <p:tn val="17"/>
+                                                  <p:tn val="21"/>
                                                 </p:cond>
                                               </p:stCondLst>
                                               <p:endCondLst>
@@ -4205,20 +4338,20 @@
                               </p:cTn>
                             </p:par>
                             <p:par>
-                              <p:cTn id="19" fill="hold">
+                              <p:cTn id="23" fill="hold">
                                 <p:stCondLst>
-                                  <p:cond delay="5500"/>
+                                  <p:cond delay="6500"/>
                                 </p:stCondLst>
                                 <p:childTnLst>
                                   <p:par>
-                                    <p:cTn id="20" presetID="42" presetClass="path" presetSubtype="0" accel="50000" decel="50000" fill="hold" nodeType="afterEffect">
+                                    <p:cTn id="24" presetID="42" presetClass="path" presetSubtype="0" accel="50000" decel="50000" fill="hold" nodeType="afterEffect">
                                       <p:stCondLst>
                                         <p:cond delay="0"/>
                                       </p:stCondLst>
                                       <p:childTnLst>
-                                        <p:animMotion origin="layout" path="M -1.04167E-6 1.85185E-6 L -0.41797 -0.49514 " pathEditMode="relative" rAng="0" ptsTypes="AA">
+                                        <p:animMotion origin="layout" path="M -1.04167E-6 1.85185E-6 L -0.44792 -0.40671 " pathEditMode="relative" rAng="0" ptsTypes="AA">
                                           <p:cBhvr>
-                                            <p:cTn id="21" dur="1000" fill="hold"/>
+                                            <p:cTn id="25" dur="1000" fill="hold"/>
                                             <p:tgtEl>
                                               <p:spTgt spid="1042"/>
                                             </p:tgtEl>
@@ -4227,20 +4360,20 @@
                                               <p:attrName>ppt_y</p:attrName>
                                             </p:attrNameLst>
                                           </p:cBhvr>
-                                          <p:rCtr x="-20898" y="-24769"/>
+                                          <p:rCtr x="-22396" y="-20347"/>
                                         </p:animMotion>
                                       </p:childTnLst>
                                     </p:cTn>
                                   </p:par>
                                   <p:par>
-                                    <p:cTn id="22" presetID="6" presetClass="emph" presetSubtype="0" fill="hold" nodeType="withEffect">
+                                    <p:cTn id="26" presetID="6" presetClass="emph" presetSubtype="0" fill="hold" nodeType="withEffect">
                                       <p:stCondLst>
                                         <p:cond delay="0"/>
                                       </p:stCondLst>
                                       <p:childTnLst>
                                         <p:animScale>
                                           <p:cBhvr>
-                                            <p:cTn id="23" dur="1000" fill="hold"/>
+                                            <p:cTn id="27" dur="1000" fill="hold"/>
                                             <p:tgtEl>
                                               <p:spTgt spid="1042"/>
                                             </p:tgtEl>
@@ -4254,20 +4387,20 @@
                               </p:cTn>
                             </p:par>
                             <p:par>
-                              <p:cTn id="24" fill="hold">
+                              <p:cTn id="28" fill="hold">
                                 <p:stCondLst>
-                                  <p:cond delay="6500"/>
+                                  <p:cond delay="7500"/>
                                 </p:stCondLst>
                                 <p:childTnLst>
                                   <p:par>
-                                    <p:cTn id="25" presetID="41" presetClass="path" presetSubtype="0" accel="50000" decel="50000" fill="hold" nodeType="afterEffect">
+                                    <p:cTn id="29" presetID="41" presetClass="path" presetSubtype="0" accel="50000" decel="50000" fill="hold" nodeType="afterEffect">
                                       <p:stCondLst>
                                         <p:cond delay="0"/>
                                       </p:stCondLst>
                                       <p:childTnLst>
-                                        <p:animMotion origin="layout" path="M -0.41797 -0.49514 C -0.41888 -0.50533 -0.42148 -0.51505 -0.42239 -0.51505 C -0.42812 -0.51505 -0.43411 -0.35672 -0.43411 -0.19746 C -0.43411 -0.27778 -0.43711 -0.35672 -0.43984 -0.35672 C -0.44284 -0.35672 -0.44557 -0.27662 -0.44557 -0.19746 C -0.44557 -0.23704 -0.44687 -0.27778 -0.44857 -0.27778 C -0.44987 -0.27778 -0.45143 -0.23843 -0.45143 -0.19746 C -0.45143 -0.21806 -0.45221 -0.23704 -0.45299 -0.23704 C -0.45364 -0.23704 -0.45443 -0.21713 -0.45443 -0.19746 C -0.45443 -0.2081 -0.45482 -0.21806 -0.45521 -0.21806 C -0.45534 -0.21806 -0.45586 -0.20787 -0.45586 -0.19746 C -0.45586 -0.20278 -0.45612 -0.2081 -0.45625 -0.2081 C -0.45625 -0.20926 -0.45664 -0.20301 -0.45664 -0.19746 C -0.45664 -0.20023 -0.45664 -0.20278 -0.45677 -0.20278 C -0.45677 -0.20162 -0.45703 -0.2 -0.45703 -0.19746 C -0.45703 -0.19885 -0.45703 -0.20023 -0.45703 -0.20162 C -0.45716 -0.20162 -0.45716 -0.20023 -0.45716 -0.19885 C -0.45729 -0.19885 -0.45729 -0.2 -0.45729 -0.20162 C -0.45742 -0.20162 -0.45742 -0.20023 -0.45742 -0.19885 " pathEditMode="relative" rAng="0" ptsTypes="AAAAAAAAAAAAAAAAAAA">
+                                        <p:animMotion origin="layout" path="M -0.44792 -0.40671 C -0.44831 -0.41366 -0.44935 -0.41991 -0.44974 -0.41991 C -0.45169 -0.41991 -0.45417 -0.31273 -0.45417 -0.20463 C -0.45417 -0.25949 -0.45508 -0.31273 -0.45612 -0.31273 C -0.45716 -0.31273 -0.4582 -0.25857 -0.4582 -0.20463 C -0.4582 -0.23171 -0.45846 -0.25949 -0.45911 -0.25949 C -0.4595 -0.25949 -0.46016 -0.23264 -0.46016 -0.20463 C -0.46016 -0.21898 -0.46055 -0.23171 -0.46081 -0.23171 C -0.46081 -0.23148 -0.4612 -0.21829 -0.4612 -0.20463 C -0.4612 -0.21204 -0.46159 -0.21898 -0.46159 -0.21875 C -0.46159 -0.21898 -0.46185 -0.21181 -0.46185 -0.20463 C -0.46185 -0.20857 -0.46185 -0.21204 -0.46185 -0.21181 C -0.46185 -0.21296 -0.46211 -0.20857 -0.46211 -0.20463 C -0.46211 -0.20671 -0.46211 -0.20857 -0.46211 -0.20834 C -0.46211 -0.20764 -0.46211 -0.20648 -0.46211 -0.20463 C -0.46211 -0.20579 -0.46211 -0.20671 -0.46211 -0.20764 C -0.46211 -0.20741 -0.46211 -0.20671 -0.46211 -0.20579 C -0.46211 -0.20556 -0.46211 -0.20648 -0.46211 -0.20764 C -0.46211 -0.20741 -0.46211 -0.20671 -0.46211 -0.20579 " pathEditMode="relative" rAng="0" ptsTypes="AAAAAAAAAAAAAAAAAAA">
                                           <p:cBhvr>
-                                            <p:cTn id="26" dur="1000" fill="hold"/>
+                                            <p:cTn id="30" dur="1000" fill="hold"/>
                                             <p:tgtEl>
                                               <p:spTgt spid="1042"/>
                                             </p:tgtEl>
@@ -4276,7 +4409,7 @@
                                               <p:attrName>ppt_y</p:attrName>
                                             </p:attrNameLst>
                                           </p:cBhvr>
-                                          <p:rCtr x="-1979" y="13889"/>
+                                          <p:rCtr x="-716" y="9444"/>
                                         </p:animMotion>
                                       </p:childTnLst>
                                       <p:subTnLst>
@@ -4285,7 +4418,7 @@
                                             <p:cTn display="0" masterRel="sameClick">
                                               <p:stCondLst>
                                                 <p:cond evt="begin" delay="0">
-                                                  <p:tn val="25"/>
+                                                  <p:tn val="29"/>
                                                 </p:cond>
                                               </p:stCondLst>
                                               <p:endCondLst>

</xml_diff>